<commit_message>
Add code, data and final paper
</commit_message>
<xml_diff>
--- a/Slide_Presentation.pptx
+++ b/Slide_Presentation.pptx
@@ -13,9 +13,9 @@
     <p:sldId id="258" r:id="rId4"/>
     <p:sldId id="259" r:id="rId5"/>
     <p:sldId id="261" r:id="rId6"/>
-    <p:sldId id="264" r:id="rId7"/>
-    <p:sldId id="262" r:id="rId8"/>
-    <p:sldId id="263" r:id="rId9"/>
+    <p:sldId id="262" r:id="rId7"/>
+    <p:sldId id="263" r:id="rId8"/>
+    <p:sldId id="264" r:id="rId9"/>
     <p:sldId id="265" r:id="rId10"/>
     <p:sldId id="266" r:id="rId11"/>
     <p:sldId id="273" r:id="rId12"/>
@@ -288,7 +288,7 @@
 <file path=ppt/revisionInfo.xml><?xml version="1.0" encoding="utf-8"?>
 <p1510:revInfo xmlns:a="http://schemas.openxmlformats.org/drawingml/2006/main" xmlns:r="http://schemas.openxmlformats.org/officeDocument/2006/relationships" xmlns:p1510="http://schemas.microsoft.com/office/powerpoint/2015/10/main">
   <p1510:revLst>
-    <p1510:client id="{45DFB069-287A-48C6-A2EE-BDAC050FCD4E}" v="60" dt="2021-12-08T03:27:02.163"/>
+    <p1510:client id="{45DFB069-287A-48C6-A2EE-BDAC050FCD4E}" v="61" dt="2021-12-08T15:16:07.445"/>
   </p1510:revLst>
 </p1510:revInfo>
 </file>
@@ -298,7 +298,7 @@
   <pc:docChgLst>
     <pc:chgData name="Tian Xia" userId="93c06f42-b671-488a-88df-870be2730da8" providerId="ADAL" clId="{45DFB069-287A-48C6-A2EE-BDAC050FCD4E}"/>
     <pc:docChg chg="undo custSel addSld delSld modSld sldOrd">
-      <pc:chgData name="Tian Xia" userId="93c06f42-b671-488a-88df-870be2730da8" providerId="ADAL" clId="{45DFB069-287A-48C6-A2EE-BDAC050FCD4E}" dt="2021-12-08T04:16:03.418" v="2402" actId="20577"/>
+      <pc:chgData name="Tian Xia" userId="93c06f42-b671-488a-88df-870be2730da8" providerId="ADAL" clId="{45DFB069-287A-48C6-A2EE-BDAC050FCD4E}" dt="2021-12-08T15:16:14.594" v="2421" actId="20577"/>
       <pc:docMkLst>
         <pc:docMk/>
       </pc:docMkLst>
@@ -618,7 +618,7 @@
         </pc:spChg>
       </pc:sldChg>
       <pc:sldChg chg="modSp mod modNotesTx">
-        <pc:chgData name="Tian Xia" userId="93c06f42-b671-488a-88df-870be2730da8" providerId="ADAL" clId="{45DFB069-287A-48C6-A2EE-BDAC050FCD4E}" dt="2021-12-08T04:00:50.586" v="2385" actId="20577"/>
+        <pc:chgData name="Tian Xia" userId="93c06f42-b671-488a-88df-870be2730da8" providerId="ADAL" clId="{45DFB069-287A-48C6-A2EE-BDAC050FCD4E}" dt="2021-12-08T15:16:14.594" v="2421" actId="20577"/>
         <pc:sldMkLst>
           <pc:docMk/>
           <pc:sldMk cId="0" sldId="262"/>
@@ -648,14 +648,14 @@
           </ac:picMkLst>
         </pc:picChg>
       </pc:sldChg>
-      <pc:sldChg chg="modSp mod ord">
-        <pc:chgData name="Tian Xia" userId="93c06f42-b671-488a-88df-870be2730da8" providerId="ADAL" clId="{45DFB069-287A-48C6-A2EE-BDAC050FCD4E}" dt="2021-12-08T03:32:09.784" v="1936" actId="20577"/>
+      <pc:sldChg chg="modSp mod ord modNotesTx">
+        <pc:chgData name="Tian Xia" userId="93c06f42-b671-488a-88df-870be2730da8" providerId="ADAL" clId="{45DFB069-287A-48C6-A2EE-BDAC050FCD4E}" dt="2021-12-08T15:15:58.756" v="2418"/>
         <pc:sldMkLst>
           <pc:docMk/>
           <pc:sldMk cId="0" sldId="264"/>
         </pc:sldMkLst>
         <pc:spChg chg="mod">
-          <ac:chgData name="Tian Xia" userId="93c06f42-b671-488a-88df-870be2730da8" providerId="ADAL" clId="{45DFB069-287A-48C6-A2EE-BDAC050FCD4E}" dt="2021-12-08T03:32:09.784" v="1936" actId="20577"/>
+          <ac:chgData name="Tian Xia" userId="93c06f42-b671-488a-88df-870be2730da8" providerId="ADAL" clId="{45DFB069-287A-48C6-A2EE-BDAC050FCD4E}" dt="2021-12-08T15:03:54.993" v="2409" actId="20577"/>
           <ac:spMkLst>
             <pc:docMk/>
             <pc:sldMk cId="0" sldId="264"/>
@@ -663,7 +663,7 @@
           </ac:spMkLst>
         </pc:spChg>
         <pc:spChg chg="mod">
-          <ac:chgData name="Tian Xia" userId="93c06f42-b671-488a-88df-870be2730da8" providerId="ADAL" clId="{45DFB069-287A-48C6-A2EE-BDAC050FCD4E}" dt="2021-12-08T03:15:44.506" v="1785" actId="20577"/>
+          <ac:chgData name="Tian Xia" userId="93c06f42-b671-488a-88df-870be2730da8" providerId="ADAL" clId="{45DFB069-287A-48C6-A2EE-BDAC050FCD4E}" dt="2021-12-08T15:05:25.392" v="2414" actId="21"/>
           <ac:spMkLst>
             <pc:docMk/>
             <pc:sldMk cId="0" sldId="264"/>
@@ -739,8 +739,8 @@
           </ac:graphicFrameMkLst>
         </pc:graphicFrameChg>
       </pc:sldChg>
-      <pc:sldChg chg="addSp delSp modSp new mod">
-        <pc:chgData name="Tian Xia" userId="93c06f42-b671-488a-88df-870be2730da8" providerId="ADAL" clId="{45DFB069-287A-48C6-A2EE-BDAC050FCD4E}" dt="2021-12-07T06:28:20.829" v="41" actId="1076"/>
+      <pc:sldChg chg="addSp delSp modSp new mod ord modNotes">
+        <pc:chgData name="Tian Xia" userId="93c06f42-b671-488a-88df-870be2730da8" providerId="ADAL" clId="{45DFB069-287A-48C6-A2EE-BDAC050FCD4E}" dt="2021-12-08T15:06:18.742" v="2416"/>
         <pc:sldMkLst>
           <pc:docMk/>
           <pc:sldMk cId="1281129183" sldId="270"/>
@@ -1521,7 +1521,7 @@
               </a:spcAft>
               <a:buNone/>
             </a:pPr>
-            <a:endParaRPr/>
+            <a:endParaRPr dirty="0"/>
           </a:p>
         </p:txBody>
       </p:sp>
@@ -1837,7 +1837,12 @@
             <p:ph type="sldImg"/>
           </p:nvPr>
         </p:nvSpPr>
-        <p:spPr/>
+        <p:spPr>
+          <a:xfrm>
+            <a:off x="381000" y="685800"/>
+            <a:ext cx="6096000" cy="3429000"/>
+          </a:xfrm>
+        </p:spPr>
       </p:sp>
       <p:sp>
         <p:nvSpPr>
@@ -2945,110 +2950,6 @@
   <p:cSld>
     <p:spTree>
       <p:nvGrpSpPr>
-        <p:cNvPr id="1" name="Shape 143"/>
-        <p:cNvGrpSpPr/>
-        <p:nvPr/>
-      </p:nvGrpSpPr>
-      <p:grpSpPr>
-        <a:xfrm>
-          <a:off x="0" y="0"/>
-          <a:ext cx="0" cy="0"/>
-          <a:chOff x="0" y="0"/>
-          <a:chExt cx="0" cy="0"/>
-        </a:xfrm>
-      </p:grpSpPr>
-      <p:sp>
-        <p:nvSpPr>
-          <p:cNvPr id="144" name="Google Shape;144;g10606a811f0_0_4:notes"/>
-          <p:cNvSpPr>
-            <a:spLocks noGrp="1" noRot="1" noChangeAspect="1"/>
-          </p:cNvSpPr>
-          <p:nvPr>
-            <p:ph type="sldImg" idx="2"/>
-          </p:nvPr>
-        </p:nvSpPr>
-        <p:spPr>
-          <a:xfrm>
-            <a:off x="381000" y="685800"/>
-            <a:ext cx="6096000" cy="3429000"/>
-          </a:xfrm>
-          <a:custGeom>
-            <a:avLst/>
-            <a:gdLst/>
-            <a:ahLst/>
-            <a:cxnLst/>
-            <a:rect l="l" t="t" r="r" b="b"/>
-            <a:pathLst>
-              <a:path w="120000" h="120000" extrusionOk="0">
-                <a:moveTo>
-                  <a:pt x="0" y="0"/>
-                </a:moveTo>
-                <a:lnTo>
-                  <a:pt x="120000" y="0"/>
-                </a:lnTo>
-                <a:lnTo>
-                  <a:pt x="120000" y="120000"/>
-                </a:lnTo>
-                <a:lnTo>
-                  <a:pt x="0" y="120000"/>
-                </a:lnTo>
-                <a:close/>
-              </a:path>
-            </a:pathLst>
-          </a:custGeom>
-        </p:spPr>
-      </p:sp>
-      <p:sp>
-        <p:nvSpPr>
-          <p:cNvPr id="145" name="Google Shape;145;g10606a811f0_0_4:notes"/>
-          <p:cNvSpPr txBox="1">
-            <a:spLocks noGrp="1"/>
-          </p:cNvSpPr>
-          <p:nvPr>
-            <p:ph type="body" idx="1"/>
-          </p:nvPr>
-        </p:nvSpPr>
-        <p:spPr>
-          <a:xfrm>
-            <a:off x="685800" y="4343400"/>
-            <a:ext cx="5486400" cy="4114800"/>
-          </a:xfrm>
-          <a:prstGeom prst="rect">
-            <a:avLst/>
-          </a:prstGeom>
-        </p:spPr>
-        <p:txBody>
-          <a:bodyPr spcFirstLastPara="1" wrap="square" lIns="91425" tIns="91425" rIns="91425" bIns="91425" anchor="t" anchorCtr="0">
-            <a:noAutofit/>
-          </a:bodyPr>
-          <a:lstStyle/>
-          <a:p>
-            <a:pPr marL="0" lvl="0" indent="0" algn="l" rtl="0">
-              <a:spcBef>
-                <a:spcPts val="0"/>
-              </a:spcBef>
-              <a:spcAft>
-                <a:spcPts val="0"/>
-              </a:spcAft>
-              <a:buNone/>
-            </a:pPr>
-            <a:endParaRPr dirty="0"/>
-          </a:p>
-        </p:txBody>
-      </p:sp>
-    </p:spTree>
-  </p:cSld>
-  <p:clrMapOvr>
-    <a:masterClrMapping/>
-  </p:clrMapOvr>
-</p:notes>
-</file>
-
-<file path=ppt/notesSlides/notesSlide7.xml><?xml version="1.0" encoding="utf-8"?>
-<p:notes xmlns:a="http://schemas.openxmlformats.org/drawingml/2006/main" xmlns:r="http://schemas.openxmlformats.org/officeDocument/2006/relationships" xmlns:p="http://schemas.openxmlformats.org/presentationml/2006/main" showMasterSp="0" showMasterPhAnim="0">
-  <p:cSld>
-    <p:spTree>
-      <p:nvGrpSpPr>
         <p:cNvPr id="1" name="Shape 130"/>
         <p:cNvGrpSpPr/>
         <p:nvPr/>
@@ -3139,6 +3040,35 @@
             <a:endParaRPr lang="en-US" dirty="0"/>
           </a:p>
           <a:p>
+            <a:pPr marL="0" marR="0" lvl="0" indent="0" algn="l" defTabSz="914400" rtl="0" eaLnBrk="1" fontAlgn="auto" latinLnBrk="0" hangingPunct="1">
+              <a:lnSpc>
+                <a:spcPct val="100000"/>
+              </a:lnSpc>
+              <a:spcBef>
+                <a:spcPts val="0"/>
+              </a:spcBef>
+              <a:spcAft>
+                <a:spcPts val="0"/>
+              </a:spcAft>
+              <a:buClr>
+                <a:srgbClr val="000000"/>
+              </a:buClr>
+              <a:buSzPts val="1100"/>
+              <a:buFont typeface="Arial"/>
+              <a:buNone/>
+              <a:tabLst/>
+              <a:defRPr/>
+            </a:pPr>
+            <a:r>
+              <a:rPr lang="en-US" b="0" i="0" dirty="0">
+                <a:effectLst/>
+                <a:latin typeface="Arial" panose="020B0604020202020204" pitchFamily="34" charset="0"/>
+              </a:rPr>
+              <a:t>Efficient stepping algorithms and implementations for parallel shortest paths</a:t>
+            </a:r>
+            <a:endParaRPr lang="en-US" dirty="0"/>
+          </a:p>
+          <a:p>
             <a:pPr marL="0" lvl="0" indent="0" algn="l" rtl="0">
               <a:spcBef>
                 <a:spcPts val="0"/>
@@ -3149,8 +3079,12 @@
               <a:buNone/>
             </a:pPr>
             <a:r>
+              <a:rPr lang="en-US"/>
+              <a:t>In </a:t>
+            </a:r>
+            <a:r>
               <a:rPr lang="en-US" dirty="0"/>
-              <a:t>In each step, we process vertices with distances within a threshold 𝜃, which is computed by </a:t>
+              <a:t>each step, we process vertices with distances within a threshold 𝜃, which is computed by </a:t>
             </a:r>
             <a:r>
               <a:rPr lang="en-US" dirty="0" err="1"/>
@@ -3180,7 +3114,7 @@
 </p:notes>
 </file>
 
-<file path=ppt/notesSlides/notesSlide8.xml><?xml version="1.0" encoding="utf-8"?>
+<file path=ppt/notesSlides/notesSlide7.xml><?xml version="1.0" encoding="utf-8"?>
 <p:notes xmlns:a="http://schemas.openxmlformats.org/drawingml/2006/main" xmlns:r="http://schemas.openxmlformats.org/officeDocument/2006/relationships" xmlns:p="http://schemas.openxmlformats.org/presentationml/2006/main" showMasterSp="0" showMasterPhAnim="0">
   <p:cSld>
     <p:spTree>
@@ -3241,6 +3175,110 @@
       <p:sp>
         <p:nvSpPr>
           <p:cNvPr id="139" name="Google Shape;139;g1053a9bf707_0_2:notes"/>
+          <p:cNvSpPr txBox="1">
+            <a:spLocks noGrp="1"/>
+          </p:cNvSpPr>
+          <p:nvPr>
+            <p:ph type="body" idx="1"/>
+          </p:nvPr>
+        </p:nvSpPr>
+        <p:spPr>
+          <a:xfrm>
+            <a:off x="685800" y="4343400"/>
+            <a:ext cx="5486400" cy="4114800"/>
+          </a:xfrm>
+          <a:prstGeom prst="rect">
+            <a:avLst/>
+          </a:prstGeom>
+        </p:spPr>
+        <p:txBody>
+          <a:bodyPr spcFirstLastPara="1" wrap="square" lIns="91425" tIns="91425" rIns="91425" bIns="91425" anchor="t" anchorCtr="0">
+            <a:noAutofit/>
+          </a:bodyPr>
+          <a:lstStyle/>
+          <a:p>
+            <a:pPr marL="0" lvl="0" indent="0" algn="l" rtl="0">
+              <a:spcBef>
+                <a:spcPts val="0"/>
+              </a:spcBef>
+              <a:spcAft>
+                <a:spcPts val="0"/>
+              </a:spcAft>
+              <a:buNone/>
+            </a:pPr>
+            <a:endParaRPr dirty="0"/>
+          </a:p>
+        </p:txBody>
+      </p:sp>
+    </p:spTree>
+  </p:cSld>
+  <p:clrMapOvr>
+    <a:masterClrMapping/>
+  </p:clrMapOvr>
+</p:notes>
+</file>
+
+<file path=ppt/notesSlides/notesSlide8.xml><?xml version="1.0" encoding="utf-8"?>
+<p:notes xmlns:a="http://schemas.openxmlformats.org/drawingml/2006/main" xmlns:r="http://schemas.openxmlformats.org/officeDocument/2006/relationships" xmlns:p="http://schemas.openxmlformats.org/presentationml/2006/main" showMasterSp="0" showMasterPhAnim="0">
+  <p:cSld>
+    <p:spTree>
+      <p:nvGrpSpPr>
+        <p:cNvPr id="1" name="Shape 143"/>
+        <p:cNvGrpSpPr/>
+        <p:nvPr/>
+      </p:nvGrpSpPr>
+      <p:grpSpPr>
+        <a:xfrm>
+          <a:off x="0" y="0"/>
+          <a:ext cx="0" cy="0"/>
+          <a:chOff x="0" y="0"/>
+          <a:chExt cx="0" cy="0"/>
+        </a:xfrm>
+      </p:grpSpPr>
+      <p:sp>
+        <p:nvSpPr>
+          <p:cNvPr id="144" name="Google Shape;144;g10606a811f0_0_4:notes"/>
+          <p:cNvSpPr>
+            <a:spLocks noGrp="1" noRot="1" noChangeAspect="1"/>
+          </p:cNvSpPr>
+          <p:nvPr>
+            <p:ph type="sldImg" idx="2"/>
+          </p:nvPr>
+        </p:nvSpPr>
+        <p:spPr>
+          <a:xfrm>
+            <a:off x="381000" y="685800"/>
+            <a:ext cx="6096000" cy="3429000"/>
+          </a:xfrm>
+          <a:custGeom>
+            <a:avLst/>
+            <a:gdLst/>
+            <a:ahLst/>
+            <a:cxnLst/>
+            <a:rect l="l" t="t" r="r" b="b"/>
+            <a:pathLst>
+              <a:path w="120000" h="120000" extrusionOk="0">
+                <a:moveTo>
+                  <a:pt x="0" y="0"/>
+                </a:moveTo>
+                <a:lnTo>
+                  <a:pt x="120000" y="0"/>
+                </a:lnTo>
+                <a:lnTo>
+                  <a:pt x="120000" y="120000"/>
+                </a:lnTo>
+                <a:lnTo>
+                  <a:pt x="0" y="120000"/>
+                </a:lnTo>
+                <a:close/>
+              </a:path>
+            </a:pathLst>
+          </a:custGeom>
+        </p:spPr>
+      </p:sp>
+      <p:sp>
+        <p:nvSpPr>
+          <p:cNvPr id="145" name="Google Shape;145;g10606a811f0_0_4:notes"/>
           <p:cNvSpPr txBox="1">
             <a:spLocks noGrp="1"/>
           </p:cNvSpPr>
@@ -15530,265 +15568,6 @@
   <p:cSld>
     <p:spTree>
       <p:nvGrpSpPr>
-        <p:cNvPr id="1" name="Shape 146"/>
-        <p:cNvGrpSpPr/>
-        <p:nvPr/>
-      </p:nvGrpSpPr>
-      <p:grpSpPr>
-        <a:xfrm>
-          <a:off x="0" y="0"/>
-          <a:ext cx="0" cy="0"/>
-          <a:chOff x="0" y="0"/>
-          <a:chExt cx="0" cy="0"/>
-        </a:xfrm>
-      </p:grpSpPr>
-      <p:sp>
-        <p:nvSpPr>
-          <p:cNvPr id="147" name="Google Shape;147;p21"/>
-          <p:cNvSpPr txBox="1">
-            <a:spLocks noGrp="1"/>
-          </p:cNvSpPr>
-          <p:nvPr>
-            <p:ph type="title"/>
-          </p:nvPr>
-        </p:nvSpPr>
-        <p:spPr>
-          <a:xfrm>
-            <a:off x="311700" y="410000"/>
-            <a:ext cx="8520600" cy="607800"/>
-          </a:xfrm>
-          <a:prstGeom prst="rect">
-            <a:avLst/>
-          </a:prstGeom>
-        </p:spPr>
-        <p:txBody>
-          <a:bodyPr spcFirstLastPara="1" wrap="square" lIns="91425" tIns="91425" rIns="91425" bIns="91425" anchor="t" anchorCtr="0">
-            <a:normAutofit fontScale="90000"/>
-          </a:bodyPr>
-          <a:lstStyle/>
-          <a:p>
-            <a:pPr marL="0" lvl="0" indent="0" algn="l" rtl="0">
-              <a:spcBef>
-                <a:spcPts val="0"/>
-              </a:spcBef>
-              <a:spcAft>
-                <a:spcPts val="0"/>
-              </a:spcAft>
-              <a:buNone/>
-            </a:pPr>
-            <a:r>
-              <a:rPr lang="zh-CN" dirty="0"/>
-              <a:t>⍴-stepping Algorithm</a:t>
-            </a:r>
-            <a:r>
-              <a:rPr lang="en-US" altLang="zh-CN" dirty="0"/>
-              <a:t>[4]</a:t>
-            </a:r>
-            <a:endParaRPr dirty="0"/>
-          </a:p>
-        </p:txBody>
-      </p:sp>
-      <p:sp>
-        <p:nvSpPr>
-          <p:cNvPr id="148" name="Google Shape;148;p21"/>
-          <p:cNvSpPr txBox="1">
-            <a:spLocks noGrp="1"/>
-          </p:cNvSpPr>
-          <p:nvPr>
-            <p:ph type="body" idx="1"/>
-          </p:nvPr>
-        </p:nvSpPr>
-        <p:spPr>
-          <a:xfrm>
-            <a:off x="311700" y="1237000"/>
-            <a:ext cx="8520600" cy="3339000"/>
-          </a:xfrm>
-          <a:prstGeom prst="rect">
-            <a:avLst/>
-          </a:prstGeom>
-        </p:spPr>
-        <p:txBody>
-          <a:bodyPr spcFirstLastPara="1" wrap="square" lIns="91425" tIns="91425" rIns="91425" bIns="91425" anchor="t" anchorCtr="0">
-            <a:normAutofit fontScale="92500" lnSpcReduction="10000"/>
-          </a:bodyPr>
-          <a:lstStyle/>
-          <a:p>
-            <a:pPr marL="0" lvl="0" indent="0" algn="l" rtl="0">
-              <a:spcBef>
-                <a:spcPts val="0"/>
-              </a:spcBef>
-              <a:spcAft>
-                <a:spcPts val="0"/>
-              </a:spcAft>
-              <a:buNone/>
-            </a:pPr>
-            <a:r>
-              <a:rPr lang="zh-CN" dirty="0"/>
-              <a:t>A new stepping Algorithm:</a:t>
-            </a:r>
-            <a:endParaRPr dirty="0"/>
-          </a:p>
-          <a:p>
-            <a:pPr marL="0" lvl="0" indent="0" algn="l" rtl="0">
-              <a:spcBef>
-                <a:spcPts val="1200"/>
-              </a:spcBef>
-              <a:spcAft>
-                <a:spcPts val="0"/>
-              </a:spcAft>
-              <a:buNone/>
-            </a:pPr>
-            <a:r>
-              <a:rPr lang="zh-CN" dirty="0"/>
-              <a:t>𝜌-Stepping extracts the 𝜌 nearest vertices in the frontier, and relaxes their neighbors</a:t>
-            </a:r>
-            <a:endParaRPr dirty="0"/>
-          </a:p>
-          <a:p>
-            <a:pPr marL="0" lvl="0" indent="0" algn="l" rtl="0">
-              <a:spcBef>
-                <a:spcPts val="1200"/>
-              </a:spcBef>
-              <a:spcAft>
-                <a:spcPts val="0"/>
-              </a:spcAft>
-              <a:buNone/>
-            </a:pPr>
-            <a:r>
-              <a:rPr lang="zh-CN" i="1" dirty="0"/>
-              <a:t>EXTDIST</a:t>
-            </a:r>
-            <a:r>
-              <a:rPr lang="zh-CN" dirty="0"/>
-              <a:t> of </a:t>
-            </a:r>
-            <a:r>
-              <a:rPr lang="zh-CN" sz="3000" dirty="0"/>
-              <a:t>⍴-stepping</a:t>
-            </a:r>
-            <a:endParaRPr sz="3000" dirty="0"/>
-          </a:p>
-          <a:p>
-            <a:pPr marL="0" lvl="0" indent="0" algn="l" rtl="0">
-              <a:spcBef>
-                <a:spcPts val="1200"/>
-              </a:spcBef>
-              <a:spcAft>
-                <a:spcPts val="0"/>
-              </a:spcAft>
-              <a:buNone/>
-            </a:pPr>
-            <a:r>
-              <a:rPr lang="en-US" altLang="zh-CN" sz="3000" dirty="0">
-                <a:solidFill>
-                  <a:schemeClr val="dk1"/>
-                </a:solidFill>
-              </a:rPr>
-              <a:t>-&gt;</a:t>
-            </a:r>
-            <a:r>
-              <a:rPr lang="zh-CN" sz="3000" dirty="0">
-                <a:solidFill>
-                  <a:schemeClr val="dk1"/>
-                </a:solidFill>
-              </a:rPr>
-              <a:t> 𝜌-th smallest 𝛿 [𝑣] in Q</a:t>
-            </a:r>
-            <a:r>
-              <a:rPr lang="en-US" altLang="zh-CN" sz="3000" dirty="0">
-                <a:solidFill>
-                  <a:schemeClr val="dk1"/>
-                </a:solidFill>
-              </a:rPr>
-              <a:t>                    </a:t>
-            </a:r>
-          </a:p>
-          <a:p>
-            <a:pPr marL="0" lvl="0" indent="0" algn="l" rtl="0">
-              <a:spcBef>
-                <a:spcPts val="1200"/>
-              </a:spcBef>
-              <a:spcAft>
-                <a:spcPts val="0"/>
-              </a:spcAft>
-              <a:buNone/>
-            </a:pPr>
-            <a:r>
-              <a:rPr lang="en-US" sz="3000" dirty="0">
-                <a:solidFill>
-                  <a:schemeClr val="dk1"/>
-                </a:solidFill>
-              </a:rPr>
-              <a:t>-&gt; It will increase it search range</a:t>
-            </a:r>
-          </a:p>
-          <a:p>
-            <a:pPr marL="0" lvl="0" indent="0" algn="l" rtl="0">
-              <a:spcBef>
-                <a:spcPts val="1200"/>
-              </a:spcBef>
-              <a:spcAft>
-                <a:spcPts val="0"/>
-              </a:spcAft>
-              <a:buNone/>
-            </a:pPr>
-            <a:r>
-              <a:rPr lang="en-US" altLang="zh-CN" sz="3000" dirty="0">
-                <a:solidFill>
-                  <a:schemeClr val="dk1"/>
-                </a:solidFill>
-              </a:rPr>
-              <a:t>	</a:t>
-            </a:r>
-            <a:r>
-              <a:rPr lang="zh-CN" sz="3000" dirty="0">
-                <a:solidFill>
-                  <a:schemeClr val="dk1"/>
-                </a:solidFill>
-              </a:rPr>
-              <a:t>𝜌-th smallest 𝛿 [𝑣]</a:t>
-            </a:r>
-            <a:r>
-              <a:rPr lang="en-US" altLang="zh-CN" sz="3000" dirty="0">
-                <a:solidFill>
-                  <a:schemeClr val="dk1"/>
-                </a:solidFill>
-              </a:rPr>
-              <a:t> for each step.</a:t>
-            </a:r>
-            <a:endParaRPr sz="3000" dirty="0">
-              <a:solidFill>
-                <a:schemeClr val="dk1"/>
-              </a:solidFill>
-            </a:endParaRPr>
-          </a:p>
-          <a:p>
-            <a:pPr marL="0" lvl="0" indent="0" algn="l" rtl="0">
-              <a:spcBef>
-                <a:spcPts val="1200"/>
-              </a:spcBef>
-              <a:spcAft>
-                <a:spcPts val="1200"/>
-              </a:spcAft>
-              <a:buNone/>
-            </a:pPr>
-            <a:endParaRPr dirty="0"/>
-          </a:p>
-        </p:txBody>
-      </p:sp>
-    </p:spTree>
-  </p:cSld>
-  <p:clrMapOvr>
-    <a:masterClrMapping/>
-  </p:clrMapOvr>
-</p:sld>
-</file>
-
-<file path=ppt/slides/slide7.xml><?xml version="1.0" encoding="utf-8"?>
-<p:sld xmlns:a="http://schemas.openxmlformats.org/drawingml/2006/main" xmlns:r="http://schemas.openxmlformats.org/officeDocument/2006/relationships" xmlns:p="http://schemas.openxmlformats.org/presentationml/2006/main">
-  <p:cSld>
-    <p:spTree>
-      <p:nvGrpSpPr>
         <p:cNvPr id="1" name="Shape 133"/>
         <p:cNvGrpSpPr/>
         <p:nvPr/>
@@ -15969,7 +15748,7 @@
 </p:sld>
 </file>
 
-<file path=ppt/slides/slide8.xml><?xml version="1.0" encoding="utf-8"?>
+<file path=ppt/slides/slide7.xml><?xml version="1.0" encoding="utf-8"?>
 <p:sld xmlns:a="http://schemas.openxmlformats.org/drawingml/2006/main" xmlns:r="http://schemas.openxmlformats.org/officeDocument/2006/relationships" xmlns:p="http://schemas.openxmlformats.org/presentationml/2006/main">
   <p:cSld>
     <p:spTree>
@@ -16056,6 +15835,340 @@
           </a:ln>
         </p:spPr>
       </p:pic>
+    </p:spTree>
+  </p:cSld>
+  <p:clrMapOvr>
+    <a:masterClrMapping/>
+  </p:clrMapOvr>
+</p:sld>
+</file>
+
+<file path=ppt/slides/slide8.xml><?xml version="1.0" encoding="utf-8"?>
+<p:sld xmlns:a="http://schemas.openxmlformats.org/drawingml/2006/main" xmlns:r="http://schemas.openxmlformats.org/officeDocument/2006/relationships" xmlns:p="http://schemas.openxmlformats.org/presentationml/2006/main">
+  <p:cSld>
+    <p:spTree>
+      <p:nvGrpSpPr>
+        <p:cNvPr id="1" name="Shape 146"/>
+        <p:cNvGrpSpPr/>
+        <p:nvPr/>
+      </p:nvGrpSpPr>
+      <p:grpSpPr>
+        <a:xfrm>
+          <a:off x="0" y="0"/>
+          <a:ext cx="0" cy="0"/>
+          <a:chOff x="0" y="0"/>
+          <a:chExt cx="0" cy="0"/>
+        </a:xfrm>
+      </p:grpSpPr>
+      <p:sp>
+        <p:nvSpPr>
+          <p:cNvPr id="147" name="Google Shape;147;p21"/>
+          <p:cNvSpPr txBox="1">
+            <a:spLocks noGrp="1"/>
+          </p:cNvSpPr>
+          <p:nvPr>
+            <p:ph type="title"/>
+          </p:nvPr>
+        </p:nvSpPr>
+        <p:spPr>
+          <a:xfrm>
+            <a:off x="311700" y="410000"/>
+            <a:ext cx="8520600" cy="607800"/>
+          </a:xfrm>
+          <a:prstGeom prst="rect">
+            <a:avLst/>
+          </a:prstGeom>
+        </p:spPr>
+        <p:txBody>
+          <a:bodyPr spcFirstLastPara="1" wrap="square" lIns="91425" tIns="91425" rIns="91425" bIns="91425" anchor="t" anchorCtr="0">
+            <a:normAutofit fontScale="90000"/>
+          </a:bodyPr>
+          <a:lstStyle/>
+          <a:p>
+            <a:pPr marL="0" lvl="0" indent="0" algn="l" rtl="0">
+              <a:spcBef>
+                <a:spcPts val="0"/>
+              </a:spcBef>
+              <a:spcAft>
+                <a:spcPts val="0"/>
+              </a:spcAft>
+              <a:buNone/>
+            </a:pPr>
+            <a:r>
+              <a:rPr lang="zh-CN" dirty="0"/>
+              <a:t>⍴-stepping Algorithm</a:t>
+            </a:r>
+            <a:r>
+              <a:rPr lang="en-US" altLang="zh-CN" dirty="0"/>
+              <a:t>[4]</a:t>
+            </a:r>
+            <a:br>
+              <a:rPr lang="en-US" altLang="zh-CN" dirty="0"/>
+            </a:br>
+            <a:endParaRPr dirty="0"/>
+          </a:p>
+        </p:txBody>
+      </p:sp>
+      <p:sp>
+        <p:nvSpPr>
+          <p:cNvPr id="148" name="Google Shape;148;p21"/>
+          <p:cNvSpPr txBox="1">
+            <a:spLocks noGrp="1"/>
+          </p:cNvSpPr>
+          <p:nvPr>
+            <p:ph type="body" idx="1"/>
+          </p:nvPr>
+        </p:nvSpPr>
+        <p:spPr>
+          <a:xfrm>
+            <a:off x="311700" y="1237000"/>
+            <a:ext cx="8520600" cy="3339000"/>
+          </a:xfrm>
+          <a:prstGeom prst="rect">
+            <a:avLst/>
+          </a:prstGeom>
+        </p:spPr>
+        <p:txBody>
+          <a:bodyPr spcFirstLastPara="1" wrap="square" lIns="91425" tIns="91425" rIns="91425" bIns="91425" anchor="t" anchorCtr="0">
+            <a:normAutofit/>
+          </a:bodyPr>
+          <a:lstStyle/>
+          <a:p>
+            <a:pPr marL="0" lvl="0" indent="0" algn="l" rtl="0">
+              <a:spcBef>
+                <a:spcPts val="0"/>
+              </a:spcBef>
+              <a:spcAft>
+                <a:spcPts val="0"/>
+              </a:spcAft>
+              <a:buNone/>
+            </a:pPr>
+            <a:r>
+              <a:rPr lang="zh-CN" dirty="0"/>
+              <a:t>A new stepping Algorithm:</a:t>
+            </a:r>
+            <a:endParaRPr dirty="0"/>
+          </a:p>
+          <a:p>
+            <a:pPr marL="0" lvl="0" indent="0" algn="l" rtl="0">
+              <a:spcBef>
+                <a:spcPts val="1200"/>
+              </a:spcBef>
+              <a:spcAft>
+                <a:spcPts val="0"/>
+              </a:spcAft>
+              <a:buNone/>
+            </a:pPr>
+            <a:r>
+              <a:rPr lang="zh-CN" dirty="0"/>
+              <a:t>𝜌-Stepping extracts the 𝜌 nearest vertices in the frontier, and relaxes their neighbors</a:t>
+            </a:r>
+            <a:endParaRPr dirty="0"/>
+          </a:p>
+          <a:p>
+            <a:pPr marL="0" lvl="0" indent="0" algn="l" rtl="0">
+              <a:spcBef>
+                <a:spcPts val="1200"/>
+              </a:spcBef>
+              <a:spcAft>
+                <a:spcPts val="0"/>
+              </a:spcAft>
+              <a:buNone/>
+            </a:pPr>
+            <a:r>
+              <a:rPr lang="en-US" altLang="zh-CN" sz="3000" dirty="0">
+                <a:solidFill>
+                  <a:schemeClr val="dk1"/>
+                </a:solidFill>
+              </a:rPr>
+              <a:t>-&gt; </a:t>
+            </a:r>
+            <a:r>
+              <a:rPr lang="zh-CN" altLang="en-US" sz="3000" dirty="0">
+                <a:solidFill>
+                  <a:schemeClr val="dk1"/>
+                </a:solidFill>
+              </a:rPr>
+              <a:t>𝜌</a:t>
+            </a:r>
+            <a:r>
+              <a:rPr lang="en-US" altLang="zh-CN" sz="3000" dirty="0">
+                <a:solidFill>
+                  <a:schemeClr val="dk1"/>
+                </a:solidFill>
+              </a:rPr>
+              <a:t>-</a:t>
+            </a:r>
+            <a:r>
+              <a:rPr lang="en-US" altLang="zh-CN" sz="3000" dirty="0" err="1">
+                <a:solidFill>
+                  <a:schemeClr val="dk1"/>
+                </a:solidFill>
+              </a:rPr>
+              <a:t>th</a:t>
+            </a:r>
+            <a:r>
+              <a:rPr lang="en-US" altLang="zh-CN" sz="3000" dirty="0">
+                <a:solidFill>
+                  <a:schemeClr val="dk1"/>
+                </a:solidFill>
+              </a:rPr>
+              <a:t> smallest </a:t>
+            </a:r>
+            <a:r>
+              <a:rPr lang="zh-CN" altLang="en-US" sz="3000" dirty="0">
+                <a:solidFill>
+                  <a:schemeClr val="dk1"/>
+                </a:solidFill>
+              </a:rPr>
+              <a:t>𝛿 </a:t>
+            </a:r>
+            <a:r>
+              <a:rPr lang="en-US" altLang="zh-CN" sz="3000" dirty="0">
+                <a:solidFill>
+                  <a:schemeClr val="dk1"/>
+                </a:solidFill>
+              </a:rPr>
+              <a:t>[</a:t>
+            </a:r>
+            <a:r>
+              <a:rPr lang="zh-CN" altLang="en-US" sz="3000" dirty="0">
+                <a:solidFill>
+                  <a:schemeClr val="dk1"/>
+                </a:solidFill>
+              </a:rPr>
+              <a:t>𝑣</a:t>
+            </a:r>
+            <a:r>
+              <a:rPr lang="en-US" altLang="zh-CN" sz="3000" dirty="0">
+                <a:solidFill>
+                  <a:schemeClr val="dk1"/>
+                </a:solidFill>
+              </a:rPr>
+              <a:t>] in Q                    </a:t>
+            </a:r>
+          </a:p>
+          <a:p>
+            <a:pPr marL="0" lvl="0" indent="0" algn="l" rtl="0">
+              <a:spcBef>
+                <a:spcPts val="1200"/>
+              </a:spcBef>
+              <a:spcAft>
+                <a:spcPts val="0"/>
+              </a:spcAft>
+              <a:buNone/>
+            </a:pPr>
+            <a:r>
+              <a:rPr lang="en-US" sz="3000" dirty="0">
+                <a:solidFill>
+                  <a:schemeClr val="dk1"/>
+                </a:solidFill>
+              </a:rPr>
+              <a:t>-&gt; It will increase it search range</a:t>
+            </a:r>
+          </a:p>
+          <a:p>
+            <a:pPr marL="0" lvl="0" indent="0" algn="l" rtl="0">
+              <a:spcBef>
+                <a:spcPts val="1200"/>
+              </a:spcBef>
+              <a:spcAft>
+                <a:spcPts val="0"/>
+              </a:spcAft>
+              <a:buNone/>
+            </a:pPr>
+            <a:r>
+              <a:rPr lang="en-US" altLang="zh-CN" sz="3000" dirty="0">
+                <a:solidFill>
+                  <a:schemeClr val="dk1"/>
+                </a:solidFill>
+              </a:rPr>
+              <a:t>	</a:t>
+            </a:r>
+            <a:r>
+              <a:rPr lang="zh-CN" altLang="en-US" sz="3000" dirty="0">
+                <a:solidFill>
+                  <a:schemeClr val="dk1"/>
+                </a:solidFill>
+              </a:rPr>
+              <a:t>𝜌</a:t>
+            </a:r>
+            <a:r>
+              <a:rPr lang="en-US" altLang="zh-CN" sz="3000" dirty="0">
+                <a:solidFill>
+                  <a:schemeClr val="dk1"/>
+                </a:solidFill>
+              </a:rPr>
+              <a:t>-</a:t>
+            </a:r>
+            <a:r>
+              <a:rPr lang="en-US" altLang="zh-CN" sz="3000" dirty="0" err="1">
+                <a:solidFill>
+                  <a:schemeClr val="dk1"/>
+                </a:solidFill>
+              </a:rPr>
+              <a:t>th</a:t>
+            </a:r>
+            <a:r>
+              <a:rPr lang="en-US" altLang="zh-CN" sz="3000" dirty="0">
+                <a:solidFill>
+                  <a:schemeClr val="dk1"/>
+                </a:solidFill>
+              </a:rPr>
+              <a:t> smallest </a:t>
+            </a:r>
+            <a:r>
+              <a:rPr lang="zh-CN" altLang="en-US" sz="3000" dirty="0">
+                <a:solidFill>
+                  <a:schemeClr val="dk1"/>
+                </a:solidFill>
+              </a:rPr>
+              <a:t>𝛿 </a:t>
+            </a:r>
+            <a:r>
+              <a:rPr lang="en-US" altLang="zh-CN" sz="3000" dirty="0">
+                <a:solidFill>
+                  <a:schemeClr val="dk1"/>
+                </a:solidFill>
+              </a:rPr>
+              <a:t>[</a:t>
+            </a:r>
+            <a:r>
+              <a:rPr lang="zh-CN" altLang="en-US" sz="3000" dirty="0">
+                <a:solidFill>
+                  <a:schemeClr val="dk1"/>
+                </a:solidFill>
+              </a:rPr>
+              <a:t>𝑣</a:t>
+            </a:r>
+            <a:r>
+              <a:rPr lang="en-US" altLang="zh-CN" sz="3000" dirty="0">
+                <a:solidFill>
+                  <a:schemeClr val="dk1"/>
+                </a:solidFill>
+              </a:rPr>
+              <a:t>] for each step.</a:t>
+            </a:r>
+            <a:endParaRPr lang="en-US" sz="3000" dirty="0">
+              <a:solidFill>
+                <a:schemeClr val="dk1"/>
+              </a:solidFill>
+            </a:endParaRPr>
+          </a:p>
+          <a:p>
+            <a:pPr marL="0" lvl="0" indent="0" algn="l" rtl="0">
+              <a:spcBef>
+                <a:spcPts val="1200"/>
+              </a:spcBef>
+              <a:spcAft>
+                <a:spcPts val="1200"/>
+              </a:spcAft>
+              <a:buNone/>
+            </a:pPr>
+            <a:endParaRPr dirty="0"/>
+          </a:p>
+        </p:txBody>
+      </p:sp>
     </p:spTree>
   </p:cSld>
   <p:clrMapOvr>

</xml_diff>